<commit_message>
Complete OOSD design pattern cheatsheet
</commit_message>
<xml_diff>
--- a/OOSD/Exam Preparation/Exam Preparation.pptx
+++ b/OOSD/Exam Preparation/Exam Preparation.pptx
@@ -5,16 +5,15 @@
     <p:sldMasterId id="2147483648" r:id="rId1"/>
   </p:sldMasterIdLst>
   <p:notesMasterIdLst>
-    <p:notesMasterId r:id="rId9"/>
+    <p:notesMasterId r:id="rId8"/>
   </p:notesMasterIdLst>
   <p:sldIdLst>
     <p:sldId id="256" r:id="rId2"/>
-    <p:sldId id="287" r:id="rId3"/>
-    <p:sldId id="288" r:id="rId4"/>
-    <p:sldId id="289" r:id="rId5"/>
-    <p:sldId id="290" r:id="rId6"/>
-    <p:sldId id="292" r:id="rId7"/>
-    <p:sldId id="293" r:id="rId8"/>
+    <p:sldId id="288" r:id="rId3"/>
+    <p:sldId id="289" r:id="rId4"/>
+    <p:sldId id="290" r:id="rId5"/>
+    <p:sldId id="292" r:id="rId6"/>
+    <p:sldId id="293" r:id="rId7"/>
   </p:sldIdLst>
   <p:sldSz cx="12192000" cy="6858000"/>
   <p:notesSz cx="6858000" cy="9144000"/>
@@ -214,7 +213,7 @@
           <a:p>
             <a:fld id="{5C15C721-1CBE-9B49-BE99-3A9DF18FA391}" type="datetimeFigureOut">
               <a:rPr lang="en-US" smtClean="0"/>
-              <a:t>6/7/19</a:t>
+              <a:t>6/10/19</a:t>
             </a:fld>
             <a:endParaRPr lang="en-US"/>
           </a:p>
@@ -733,7 +732,7 @@
     </p:spTree>
     <p:extLst>
       <p:ext uri="{BB962C8B-B14F-4D97-AF65-F5344CB8AC3E}">
-        <p14:creationId xmlns:p14="http://schemas.microsoft.com/office/powerpoint/2010/main" val="1724199351"/>
+        <p14:creationId xmlns:p14="http://schemas.microsoft.com/office/powerpoint/2010/main" val="1327878878"/>
       </p:ext>
     </p:extLst>
   </p:cSld>
@@ -821,7 +820,7 @@
     </p:spTree>
     <p:extLst>
       <p:ext uri="{BB962C8B-B14F-4D97-AF65-F5344CB8AC3E}">
-        <p14:creationId xmlns:p14="http://schemas.microsoft.com/office/powerpoint/2010/main" val="1327878878"/>
+        <p14:creationId xmlns:p14="http://schemas.microsoft.com/office/powerpoint/2010/main" val="212342229"/>
       </p:ext>
     </p:extLst>
   </p:cSld>
@@ -909,7 +908,7 @@
     </p:spTree>
     <p:extLst>
       <p:ext uri="{BB962C8B-B14F-4D97-AF65-F5344CB8AC3E}">
-        <p14:creationId xmlns:p14="http://schemas.microsoft.com/office/powerpoint/2010/main" val="212342229"/>
+        <p14:creationId xmlns:p14="http://schemas.microsoft.com/office/powerpoint/2010/main" val="1200451045"/>
       </p:ext>
     </p:extLst>
   </p:cSld>
@@ -997,7 +996,7 @@
     </p:spTree>
     <p:extLst>
       <p:ext uri="{BB962C8B-B14F-4D97-AF65-F5344CB8AC3E}">
-        <p14:creationId xmlns:p14="http://schemas.microsoft.com/office/powerpoint/2010/main" val="1200451045"/>
+        <p14:creationId xmlns:p14="http://schemas.microsoft.com/office/powerpoint/2010/main" val="625240534"/>
       </p:ext>
     </p:extLst>
   </p:cSld>
@@ -1077,94 +1076,6 @@
             <a:fld id="{5C949890-84D1-B346-997E-B43A2CF20212}" type="slidenum">
               <a:rPr lang="en-US" smtClean="0"/>
               <a:t>6</a:t>
-            </a:fld>
-            <a:endParaRPr lang="en-US"/>
-          </a:p>
-        </p:txBody>
-      </p:sp>
-    </p:spTree>
-    <p:extLst>
-      <p:ext uri="{BB962C8B-B14F-4D97-AF65-F5344CB8AC3E}">
-        <p14:creationId xmlns:p14="http://schemas.microsoft.com/office/powerpoint/2010/main" val="625240534"/>
-      </p:ext>
-    </p:extLst>
-  </p:cSld>
-  <p:clrMapOvr>
-    <a:masterClrMapping/>
-  </p:clrMapOvr>
-</p:notes>
-</file>
-
-<file path=ppt/notesSlides/notesSlide7.xml><?xml version="1.0" encoding="utf-8"?>
-<p:notes xmlns:a="http://schemas.openxmlformats.org/drawingml/2006/main" xmlns:r="http://schemas.openxmlformats.org/officeDocument/2006/relationships" xmlns:p="http://schemas.openxmlformats.org/presentationml/2006/main">
-  <p:cSld>
-    <p:spTree>
-      <p:nvGrpSpPr>
-        <p:cNvPr id="1" name=""/>
-        <p:cNvGrpSpPr/>
-        <p:nvPr/>
-      </p:nvGrpSpPr>
-      <p:grpSpPr>
-        <a:xfrm>
-          <a:off x="0" y="0"/>
-          <a:ext cx="0" cy="0"/>
-          <a:chOff x="0" y="0"/>
-          <a:chExt cx="0" cy="0"/>
-        </a:xfrm>
-      </p:grpSpPr>
-      <p:sp>
-        <p:nvSpPr>
-          <p:cNvPr id="2" name="Slide Image Placeholder 1"/>
-          <p:cNvSpPr>
-            <a:spLocks noGrp="1" noRot="1" noChangeAspect="1"/>
-          </p:cNvSpPr>
-          <p:nvPr>
-            <p:ph type="sldImg"/>
-          </p:nvPr>
-        </p:nvSpPr>
-        <p:spPr/>
-      </p:sp>
-      <p:sp>
-        <p:nvSpPr>
-          <p:cNvPr id="3" name="Notes Placeholder 2"/>
-          <p:cNvSpPr>
-            <a:spLocks noGrp="1"/>
-          </p:cNvSpPr>
-          <p:nvPr>
-            <p:ph type="body" idx="1"/>
-          </p:nvPr>
-        </p:nvSpPr>
-        <p:spPr/>
-        <p:txBody>
-          <a:bodyPr/>
-          <a:lstStyle/>
-          <a:p>
-            <a:pPr marL="171450" indent="-171450">
-              <a:buFont typeface="Arial" charset="0"/>
-              <a:buChar char="•"/>
-            </a:pPr>
-            <a:endParaRPr lang="en-US" baseline="0" dirty="0" smtClean="0"/>
-          </a:p>
-        </p:txBody>
-      </p:sp>
-      <p:sp>
-        <p:nvSpPr>
-          <p:cNvPr id="4" name="Slide Number Placeholder 3"/>
-          <p:cNvSpPr>
-            <a:spLocks noGrp="1"/>
-          </p:cNvSpPr>
-          <p:nvPr>
-            <p:ph type="sldNum" sz="quarter" idx="10"/>
-          </p:nvPr>
-        </p:nvSpPr>
-        <p:spPr/>
-        <p:txBody>
-          <a:bodyPr/>
-          <a:lstStyle/>
-          <a:p>
-            <a:fld id="{5C949890-84D1-B346-997E-B43A2CF20212}" type="slidenum">
-              <a:rPr lang="en-US" smtClean="0"/>
-              <a:t>7</a:t>
             </a:fld>
             <a:endParaRPr lang="en-US"/>
           </a:p>
@@ -1314,7 +1225,7 @@
           <a:p>
             <a:fld id="{BD4CA122-8521-6D44-9B67-558DC60F8753}" type="datetimeFigureOut">
               <a:rPr lang="en-US" smtClean="0"/>
-              <a:t>6/7/19</a:t>
+              <a:t>6/10/19</a:t>
             </a:fld>
             <a:endParaRPr lang="en-US"/>
           </a:p>
@@ -1484,7 +1395,7 @@
           <a:p>
             <a:fld id="{BD4CA122-8521-6D44-9B67-558DC60F8753}" type="datetimeFigureOut">
               <a:rPr lang="en-US" smtClean="0"/>
-              <a:t>6/7/19</a:t>
+              <a:t>6/10/19</a:t>
             </a:fld>
             <a:endParaRPr lang="en-US"/>
           </a:p>
@@ -1664,7 +1575,7 @@
           <a:p>
             <a:fld id="{BD4CA122-8521-6D44-9B67-558DC60F8753}" type="datetimeFigureOut">
               <a:rPr lang="en-US" smtClean="0"/>
-              <a:t>6/7/19</a:t>
+              <a:t>6/10/19</a:t>
             </a:fld>
             <a:endParaRPr lang="en-US"/>
           </a:p>
@@ -1834,7 +1745,7 @@
           <a:p>
             <a:fld id="{BD4CA122-8521-6D44-9B67-558DC60F8753}" type="datetimeFigureOut">
               <a:rPr lang="en-US" smtClean="0"/>
-              <a:t>6/7/19</a:t>
+              <a:t>6/10/19</a:t>
             </a:fld>
             <a:endParaRPr lang="en-US"/>
           </a:p>
@@ -2080,7 +1991,7 @@
           <a:p>
             <a:fld id="{BD4CA122-8521-6D44-9B67-558DC60F8753}" type="datetimeFigureOut">
               <a:rPr lang="en-US" smtClean="0"/>
-              <a:t>6/7/19</a:t>
+              <a:t>6/10/19</a:t>
             </a:fld>
             <a:endParaRPr lang="en-US"/>
           </a:p>
@@ -2312,7 +2223,7 @@
           <a:p>
             <a:fld id="{BD4CA122-8521-6D44-9B67-558DC60F8753}" type="datetimeFigureOut">
               <a:rPr lang="en-US" smtClean="0"/>
-              <a:t>6/7/19</a:t>
+              <a:t>6/10/19</a:t>
             </a:fld>
             <a:endParaRPr lang="en-US"/>
           </a:p>
@@ -2679,7 +2590,7 @@
           <a:p>
             <a:fld id="{BD4CA122-8521-6D44-9B67-558DC60F8753}" type="datetimeFigureOut">
               <a:rPr lang="en-US" smtClean="0"/>
-              <a:t>6/7/19</a:t>
+              <a:t>6/10/19</a:t>
             </a:fld>
             <a:endParaRPr lang="en-US"/>
           </a:p>
@@ -2797,7 +2708,7 @@
           <a:p>
             <a:fld id="{BD4CA122-8521-6D44-9B67-558DC60F8753}" type="datetimeFigureOut">
               <a:rPr lang="en-US" smtClean="0"/>
-              <a:t>6/7/19</a:t>
+              <a:t>6/10/19</a:t>
             </a:fld>
             <a:endParaRPr lang="en-US"/>
           </a:p>
@@ -2892,7 +2803,7 @@
           <a:p>
             <a:fld id="{BD4CA122-8521-6D44-9B67-558DC60F8753}" type="datetimeFigureOut">
               <a:rPr lang="en-US" smtClean="0"/>
-              <a:t>6/7/19</a:t>
+              <a:t>6/10/19</a:t>
             </a:fld>
             <a:endParaRPr lang="en-US"/>
           </a:p>
@@ -3169,7 +3080,7 @@
           <a:p>
             <a:fld id="{BD4CA122-8521-6D44-9B67-558DC60F8753}" type="datetimeFigureOut">
               <a:rPr lang="en-US" smtClean="0"/>
-              <a:t>6/7/19</a:t>
+              <a:t>6/10/19</a:t>
             </a:fld>
             <a:endParaRPr lang="en-US"/>
           </a:p>
@@ -3422,7 +3333,7 @@
           <a:p>
             <a:fld id="{BD4CA122-8521-6D44-9B67-558DC60F8753}" type="datetimeFigureOut">
               <a:rPr lang="en-US" smtClean="0"/>
-              <a:t>6/7/19</a:t>
+              <a:t>6/10/19</a:t>
             </a:fld>
             <a:endParaRPr lang="en-US"/>
           </a:p>
@@ -3635,7 +3546,7 @@
           <a:p>
             <a:fld id="{BD4CA122-8521-6D44-9B67-558DC60F8753}" type="datetimeFigureOut">
               <a:rPr lang="en-US" smtClean="0"/>
-              <a:t>6/7/19</a:t>
+              <a:t>6/10/19</a:t>
             </a:fld>
             <a:endParaRPr lang="en-US"/>
           </a:p>
@@ -4203,7 +4114,7 @@
             </a:r>
             <a:r>
               <a:rPr lang="en-US" sz="3800" b="1" dirty="0" smtClean="0"/>
-              <a:t>Design patterns</a:t>
+              <a:t>Map, filter, reduce and lambda</a:t>
             </a:r>
           </a:p>
           <a:p>
@@ -4221,7 +4132,7 @@
     </p:spTree>
     <p:extLst>
       <p:ext uri="{BB962C8B-B14F-4D97-AF65-F5344CB8AC3E}">
-        <p14:creationId xmlns:p14="http://schemas.microsoft.com/office/powerpoint/2010/main" val="739781462"/>
+        <p14:creationId xmlns:p14="http://schemas.microsoft.com/office/powerpoint/2010/main" val="247320089"/>
       </p:ext>
     </p:extLst>
   </p:cSld>
@@ -4317,7 +4228,7 @@
             </a:r>
             <a:r>
               <a:rPr lang="en-US" sz="3800" b="1" dirty="0" smtClean="0"/>
-              <a:t>Map, filter, reduce and lambda</a:t>
+              <a:t>SOLID principles</a:t>
             </a:r>
           </a:p>
           <a:p>
@@ -4335,7 +4246,7 @@
     </p:spTree>
     <p:extLst>
       <p:ext uri="{BB962C8B-B14F-4D97-AF65-F5344CB8AC3E}">
-        <p14:creationId xmlns:p14="http://schemas.microsoft.com/office/powerpoint/2010/main" val="247320089"/>
+        <p14:creationId xmlns:p14="http://schemas.microsoft.com/office/powerpoint/2010/main" val="863887028"/>
       </p:ext>
     </p:extLst>
   </p:cSld>
@@ -4431,7 +4342,7 @@
             </a:r>
             <a:r>
               <a:rPr lang="en-US" sz="3800" b="1" dirty="0" smtClean="0"/>
-              <a:t>SOLID principles</a:t>
+              <a:t>Django</a:t>
             </a:r>
           </a:p>
           <a:p>
@@ -4449,7 +4360,7 @@
     </p:spTree>
     <p:extLst>
       <p:ext uri="{BB962C8B-B14F-4D97-AF65-F5344CB8AC3E}">
-        <p14:creationId xmlns:p14="http://schemas.microsoft.com/office/powerpoint/2010/main" val="863887028"/>
+        <p14:creationId xmlns:p14="http://schemas.microsoft.com/office/powerpoint/2010/main" val="843118793"/>
       </p:ext>
     </p:extLst>
   </p:cSld>
@@ -4545,7 +4456,7 @@
             </a:r>
             <a:r>
               <a:rPr lang="en-US" sz="3800" b="1" dirty="0" smtClean="0"/>
-              <a:t>Django</a:t>
+              <a:t>Exception handling</a:t>
             </a:r>
           </a:p>
           <a:p>
@@ -4563,7 +4474,7 @@
     </p:spTree>
     <p:extLst>
       <p:ext uri="{BB962C8B-B14F-4D97-AF65-F5344CB8AC3E}">
-        <p14:creationId xmlns:p14="http://schemas.microsoft.com/office/powerpoint/2010/main" val="843118793"/>
+        <p14:creationId xmlns:p14="http://schemas.microsoft.com/office/powerpoint/2010/main" val="1827065741"/>
       </p:ext>
     </p:extLst>
   </p:cSld>
@@ -4626,120 +4537,6 @@
             <a:fld id="{B822FDE6-25CA-0444-94EE-C6FC8C5EFEB8}" type="slidenum">
               <a:rPr lang="en-US" smtClean="0"/>
               <a:t>6</a:t>
-            </a:fld>
-            <a:endParaRPr lang="en-US"/>
-          </a:p>
-        </p:txBody>
-      </p:sp>
-      <p:sp>
-        <p:nvSpPr>
-          <p:cNvPr id="6" name="Rectangle 5"/>
-          <p:cNvSpPr/>
-          <p:nvPr/>
-        </p:nvSpPr>
-        <p:spPr>
-          <a:xfrm>
-            <a:off x="0" y="1299607"/>
-            <a:ext cx="12192000" cy="1646605"/>
-          </a:xfrm>
-          <a:prstGeom prst="rect">
-            <a:avLst/>
-          </a:prstGeom>
-          <a:noFill/>
-        </p:spPr>
-        <p:txBody>
-          <a:bodyPr wrap="square" lIns="91440" tIns="45720" rIns="91440" bIns="45720">
-            <a:spAutoFit/>
-          </a:bodyPr>
-          <a:lstStyle/>
-          <a:p>
-            <a:r>
-              <a:rPr lang="en-US" sz="3800" dirty="0" smtClean="0"/>
-              <a:t>	</a:t>
-            </a:r>
-            <a:r>
-              <a:rPr lang="en-US" sz="3800" b="1" dirty="0" smtClean="0"/>
-              <a:t>Exception handling</a:t>
-            </a:r>
-          </a:p>
-          <a:p>
-            <a:endParaRPr lang="en-US" sz="3800" b="1" dirty="0"/>
-          </a:p>
-          <a:p>
-            <a:pPr marL="1485900" lvl="2" indent="-571500">
-              <a:buFont typeface="Arial" charset="0"/>
-              <a:buChar char="•"/>
-            </a:pPr>
-            <a:endParaRPr lang="en-US" sz="2500" dirty="0" smtClean="0"/>
-          </a:p>
-        </p:txBody>
-      </p:sp>
-    </p:spTree>
-    <p:extLst>
-      <p:ext uri="{BB962C8B-B14F-4D97-AF65-F5344CB8AC3E}">
-        <p14:creationId xmlns:p14="http://schemas.microsoft.com/office/powerpoint/2010/main" val="1827065741"/>
-      </p:ext>
-    </p:extLst>
-  </p:cSld>
-  <p:clrMapOvr>
-    <a:masterClrMapping/>
-  </p:clrMapOvr>
-  <p:timing>
-    <p:tnLst>
-      <p:par>
-        <p:cTn id="1" dur="indefinite" restart="never" nodeType="tmRoot"/>
-      </p:par>
-    </p:tnLst>
-  </p:timing>
-</p:sld>
-</file>
-
-<file path=ppt/slides/slide7.xml><?xml version="1.0" encoding="utf-8"?>
-<p:sld xmlns:a="http://schemas.openxmlformats.org/drawingml/2006/main" xmlns:r="http://schemas.openxmlformats.org/officeDocument/2006/relationships" xmlns:p="http://schemas.openxmlformats.org/presentationml/2006/main">
-  <p:cSld>
-    <p:bg>
-      <p:bgPr>
-        <a:solidFill>
-          <a:schemeClr val="accent5">
-            <a:lumMod val="60000"/>
-            <a:lumOff val="40000"/>
-          </a:schemeClr>
-        </a:solidFill>
-        <a:effectLst/>
-      </p:bgPr>
-    </p:bg>
-    <p:spTree>
-      <p:nvGrpSpPr>
-        <p:cNvPr id="1" name=""/>
-        <p:cNvGrpSpPr/>
-        <p:nvPr/>
-      </p:nvGrpSpPr>
-      <p:grpSpPr>
-        <a:xfrm>
-          <a:off x="0" y="0"/>
-          <a:ext cx="0" cy="0"/>
-          <a:chOff x="0" y="0"/>
-          <a:chExt cx="0" cy="0"/>
-        </a:xfrm>
-      </p:grpSpPr>
-      <p:sp>
-        <p:nvSpPr>
-          <p:cNvPr id="9" name="Slide Number Placeholder 8"/>
-          <p:cNvSpPr>
-            <a:spLocks noGrp="1"/>
-          </p:cNvSpPr>
-          <p:nvPr>
-            <p:ph type="sldNum" sz="quarter" idx="12"/>
-          </p:nvPr>
-        </p:nvSpPr>
-        <p:spPr/>
-        <p:txBody>
-          <a:bodyPr/>
-          <a:lstStyle/>
-          <a:p>
-            <a:fld id="{B822FDE6-25CA-0444-94EE-C6FC8C5EFEB8}" type="slidenum">
-              <a:rPr lang="en-US" smtClean="0"/>
-              <a:t>7</a:t>
             </a:fld>
             <a:endParaRPr lang="en-US"/>
           </a:p>

</xml_diff>

<commit_message>
Fix threading assertion in OOSD practice exam
</commit_message>
<xml_diff>
--- a/OOSD/Exam Preparation/Exam Preparation.pptx
+++ b/OOSD/Exam Preparation/Exam Preparation.pptx
@@ -5,15 +5,16 @@
     <p:sldMasterId id="2147483648" r:id="rId1"/>
   </p:sldMasterIdLst>
   <p:notesMasterIdLst>
-    <p:notesMasterId r:id="rId8"/>
+    <p:notesMasterId r:id="rId9"/>
   </p:notesMasterIdLst>
   <p:sldIdLst>
     <p:sldId id="256" r:id="rId2"/>
     <p:sldId id="288" r:id="rId3"/>
     <p:sldId id="289" r:id="rId4"/>
     <p:sldId id="290" r:id="rId5"/>
-    <p:sldId id="292" r:id="rId6"/>
-    <p:sldId id="293" r:id="rId7"/>
+    <p:sldId id="294" r:id="rId6"/>
+    <p:sldId id="292" r:id="rId7"/>
+    <p:sldId id="293" r:id="rId8"/>
   </p:sldIdLst>
   <p:sldSz cx="12192000" cy="6858000"/>
   <p:notesSz cx="6858000" cy="9144000"/>
@@ -996,7 +997,7 @@
     </p:spTree>
     <p:extLst>
       <p:ext uri="{BB962C8B-B14F-4D97-AF65-F5344CB8AC3E}">
-        <p14:creationId xmlns:p14="http://schemas.microsoft.com/office/powerpoint/2010/main" val="625240534"/>
+        <p14:creationId xmlns:p14="http://schemas.microsoft.com/office/powerpoint/2010/main" val="698314436"/>
       </p:ext>
     </p:extLst>
   </p:cSld>
@@ -1076,6 +1077,94 @@
             <a:fld id="{5C949890-84D1-B346-997E-B43A2CF20212}" type="slidenum">
               <a:rPr lang="en-US" smtClean="0"/>
               <a:t>6</a:t>
+            </a:fld>
+            <a:endParaRPr lang="en-US"/>
+          </a:p>
+        </p:txBody>
+      </p:sp>
+    </p:spTree>
+    <p:extLst>
+      <p:ext uri="{BB962C8B-B14F-4D97-AF65-F5344CB8AC3E}">
+        <p14:creationId xmlns:p14="http://schemas.microsoft.com/office/powerpoint/2010/main" val="625240534"/>
+      </p:ext>
+    </p:extLst>
+  </p:cSld>
+  <p:clrMapOvr>
+    <a:masterClrMapping/>
+  </p:clrMapOvr>
+</p:notes>
+</file>
+
+<file path=ppt/notesSlides/notesSlide7.xml><?xml version="1.0" encoding="utf-8"?>
+<p:notes xmlns:a="http://schemas.openxmlformats.org/drawingml/2006/main" xmlns:r="http://schemas.openxmlformats.org/officeDocument/2006/relationships" xmlns:p="http://schemas.openxmlformats.org/presentationml/2006/main">
+  <p:cSld>
+    <p:spTree>
+      <p:nvGrpSpPr>
+        <p:cNvPr id="1" name=""/>
+        <p:cNvGrpSpPr/>
+        <p:nvPr/>
+      </p:nvGrpSpPr>
+      <p:grpSpPr>
+        <a:xfrm>
+          <a:off x="0" y="0"/>
+          <a:ext cx="0" cy="0"/>
+          <a:chOff x="0" y="0"/>
+          <a:chExt cx="0" cy="0"/>
+        </a:xfrm>
+      </p:grpSpPr>
+      <p:sp>
+        <p:nvSpPr>
+          <p:cNvPr id="2" name="Slide Image Placeholder 1"/>
+          <p:cNvSpPr>
+            <a:spLocks noGrp="1" noRot="1" noChangeAspect="1"/>
+          </p:cNvSpPr>
+          <p:nvPr>
+            <p:ph type="sldImg"/>
+          </p:nvPr>
+        </p:nvSpPr>
+        <p:spPr/>
+      </p:sp>
+      <p:sp>
+        <p:nvSpPr>
+          <p:cNvPr id="3" name="Notes Placeholder 2"/>
+          <p:cNvSpPr>
+            <a:spLocks noGrp="1"/>
+          </p:cNvSpPr>
+          <p:nvPr>
+            <p:ph type="body" idx="1"/>
+          </p:nvPr>
+        </p:nvSpPr>
+        <p:spPr/>
+        <p:txBody>
+          <a:bodyPr/>
+          <a:lstStyle/>
+          <a:p>
+            <a:pPr marL="171450" indent="-171450">
+              <a:buFont typeface="Arial" charset="0"/>
+              <a:buChar char="•"/>
+            </a:pPr>
+            <a:endParaRPr lang="en-US" baseline="0" dirty="0" smtClean="0"/>
+          </a:p>
+        </p:txBody>
+      </p:sp>
+      <p:sp>
+        <p:nvSpPr>
+          <p:cNvPr id="4" name="Slide Number Placeholder 3"/>
+          <p:cNvSpPr>
+            <a:spLocks noGrp="1"/>
+          </p:cNvSpPr>
+          <p:nvPr>
+            <p:ph type="sldNum" sz="quarter" idx="10"/>
+          </p:nvPr>
+        </p:nvSpPr>
+        <p:spPr/>
+        <p:txBody>
+          <a:bodyPr/>
+          <a:lstStyle/>
+          <a:p>
+            <a:fld id="{5C949890-84D1-B346-997E-B43A2CF20212}" type="slidenum">
+              <a:rPr lang="en-US" smtClean="0"/>
+              <a:t>7</a:t>
             </a:fld>
             <a:endParaRPr lang="en-US"/>
           </a:p>
@@ -4456,8 +4545,9 @@
             </a:r>
             <a:r>
               <a:rPr lang="en-US" sz="3800" b="1" dirty="0" smtClean="0"/>
-              <a:t>Exception handling</a:t>
-            </a:r>
+              <a:t>Unit and E2E Testing</a:t>
+            </a:r>
+            <a:endParaRPr lang="en-US" sz="3800" b="1" dirty="0" smtClean="0"/>
           </a:p>
           <a:p>
             <a:endParaRPr lang="en-US" sz="3800" b="1" dirty="0"/>
@@ -4474,7 +4564,7 @@
     </p:spTree>
     <p:extLst>
       <p:ext uri="{BB962C8B-B14F-4D97-AF65-F5344CB8AC3E}">
-        <p14:creationId xmlns:p14="http://schemas.microsoft.com/office/powerpoint/2010/main" val="1827065741"/>
+        <p14:creationId xmlns:p14="http://schemas.microsoft.com/office/powerpoint/2010/main" val="1313805270"/>
       </p:ext>
     </p:extLst>
   </p:cSld>
@@ -4537,6 +4627,120 @@
             <a:fld id="{B822FDE6-25CA-0444-94EE-C6FC8C5EFEB8}" type="slidenum">
               <a:rPr lang="en-US" smtClean="0"/>
               <a:t>6</a:t>
+            </a:fld>
+            <a:endParaRPr lang="en-US"/>
+          </a:p>
+        </p:txBody>
+      </p:sp>
+      <p:sp>
+        <p:nvSpPr>
+          <p:cNvPr id="6" name="Rectangle 5"/>
+          <p:cNvSpPr/>
+          <p:nvPr/>
+        </p:nvSpPr>
+        <p:spPr>
+          <a:xfrm>
+            <a:off x="0" y="1299607"/>
+            <a:ext cx="12192000" cy="1646605"/>
+          </a:xfrm>
+          <a:prstGeom prst="rect">
+            <a:avLst/>
+          </a:prstGeom>
+          <a:noFill/>
+        </p:spPr>
+        <p:txBody>
+          <a:bodyPr wrap="square" lIns="91440" tIns="45720" rIns="91440" bIns="45720">
+            <a:spAutoFit/>
+          </a:bodyPr>
+          <a:lstStyle/>
+          <a:p>
+            <a:r>
+              <a:rPr lang="en-US" sz="3800" dirty="0" smtClean="0"/>
+              <a:t>	</a:t>
+            </a:r>
+            <a:r>
+              <a:rPr lang="en-US" sz="3800" b="1" dirty="0" smtClean="0"/>
+              <a:t>Exception handling</a:t>
+            </a:r>
+          </a:p>
+          <a:p>
+            <a:endParaRPr lang="en-US" sz="3800" b="1" dirty="0"/>
+          </a:p>
+          <a:p>
+            <a:pPr marL="1485900" lvl="2" indent="-571500">
+              <a:buFont typeface="Arial" charset="0"/>
+              <a:buChar char="•"/>
+            </a:pPr>
+            <a:endParaRPr lang="en-US" sz="2500" dirty="0" smtClean="0"/>
+          </a:p>
+        </p:txBody>
+      </p:sp>
+    </p:spTree>
+    <p:extLst>
+      <p:ext uri="{BB962C8B-B14F-4D97-AF65-F5344CB8AC3E}">
+        <p14:creationId xmlns:p14="http://schemas.microsoft.com/office/powerpoint/2010/main" val="1827065741"/>
+      </p:ext>
+    </p:extLst>
+  </p:cSld>
+  <p:clrMapOvr>
+    <a:masterClrMapping/>
+  </p:clrMapOvr>
+  <p:timing>
+    <p:tnLst>
+      <p:par>
+        <p:cTn id="1" dur="indefinite" restart="never" nodeType="tmRoot"/>
+      </p:par>
+    </p:tnLst>
+  </p:timing>
+</p:sld>
+</file>
+
+<file path=ppt/slides/slide7.xml><?xml version="1.0" encoding="utf-8"?>
+<p:sld xmlns:a="http://schemas.openxmlformats.org/drawingml/2006/main" xmlns:r="http://schemas.openxmlformats.org/officeDocument/2006/relationships" xmlns:p="http://schemas.openxmlformats.org/presentationml/2006/main">
+  <p:cSld>
+    <p:bg>
+      <p:bgPr>
+        <a:solidFill>
+          <a:schemeClr val="accent5">
+            <a:lumMod val="60000"/>
+            <a:lumOff val="40000"/>
+          </a:schemeClr>
+        </a:solidFill>
+        <a:effectLst/>
+      </p:bgPr>
+    </p:bg>
+    <p:spTree>
+      <p:nvGrpSpPr>
+        <p:cNvPr id="1" name=""/>
+        <p:cNvGrpSpPr/>
+        <p:nvPr/>
+      </p:nvGrpSpPr>
+      <p:grpSpPr>
+        <a:xfrm>
+          <a:off x="0" y="0"/>
+          <a:ext cx="0" cy="0"/>
+          <a:chOff x="0" y="0"/>
+          <a:chExt cx="0" cy="0"/>
+        </a:xfrm>
+      </p:grpSpPr>
+      <p:sp>
+        <p:nvSpPr>
+          <p:cNvPr id="9" name="Slide Number Placeholder 8"/>
+          <p:cNvSpPr>
+            <a:spLocks noGrp="1"/>
+          </p:cNvSpPr>
+          <p:nvPr>
+            <p:ph type="sldNum" sz="quarter" idx="12"/>
+          </p:nvPr>
+        </p:nvSpPr>
+        <p:spPr/>
+        <p:txBody>
+          <a:bodyPr/>
+          <a:lstStyle/>
+          <a:p>
+            <a:fld id="{B822FDE6-25CA-0444-94EE-C6FC8C5EFEB8}" type="slidenum">
+              <a:rPr lang="en-US" smtClean="0"/>
+              <a:t>7</a:t>
             </a:fld>
             <a:endParaRPr lang="en-US"/>
           </a:p>

</xml_diff>

<commit_message>
Complete OOSD exam prep slides
</commit_message>
<xml_diff>
--- a/OOSD/Exam Preparation/Exam Preparation.pptx
+++ b/OOSD/Exam Preparation/Exam Preparation.pptx
@@ -5,16 +5,17 @@
     <p:sldMasterId id="2147483648" r:id="rId1"/>
   </p:sldMasterIdLst>
   <p:notesMasterIdLst>
-    <p:notesMasterId r:id="rId9"/>
+    <p:notesMasterId r:id="rId10"/>
   </p:notesMasterIdLst>
   <p:sldIdLst>
     <p:sldId id="256" r:id="rId2"/>
     <p:sldId id="288" r:id="rId3"/>
-    <p:sldId id="289" r:id="rId4"/>
-    <p:sldId id="290" r:id="rId5"/>
-    <p:sldId id="294" r:id="rId6"/>
-    <p:sldId id="292" r:id="rId7"/>
-    <p:sldId id="293" r:id="rId8"/>
+    <p:sldId id="295" r:id="rId4"/>
+    <p:sldId id="289" r:id="rId5"/>
+    <p:sldId id="290" r:id="rId6"/>
+    <p:sldId id="294" r:id="rId7"/>
+    <p:sldId id="292" r:id="rId8"/>
+    <p:sldId id="293" r:id="rId9"/>
   </p:sldIdLst>
   <p:sldSz cx="12192000" cy="6858000"/>
   <p:notesSz cx="6858000" cy="9144000"/>
@@ -214,7 +215,7 @@
           <a:p>
             <a:fld id="{5C15C721-1CBE-9B49-BE99-3A9DF18FA391}" type="datetimeFigureOut">
               <a:rPr lang="en-US" smtClean="0"/>
-              <a:t>6/10/19</a:t>
+              <a:t>6/11/19</a:t>
             </a:fld>
             <a:endParaRPr lang="en-US"/>
           </a:p>
@@ -531,9 +532,10 @@
               <a:buNone/>
             </a:pPr>
             <a:r>
-              <a:rPr lang="en-US" dirty="0" smtClean="0"/>
-              <a:t>Overview</a:t>
-            </a:r>
+              <a:rPr lang="en-US" smtClean="0"/>
+              <a:t>What will be in the exam:</a:t>
+            </a:r>
+            <a:endParaRPr lang="en-US" dirty="0" smtClean="0"/>
           </a:p>
           <a:p>
             <a:pPr marL="171450" indent="-171450">
@@ -821,7 +823,7 @@
     </p:spTree>
     <p:extLst>
       <p:ext uri="{BB962C8B-B14F-4D97-AF65-F5344CB8AC3E}">
-        <p14:creationId xmlns:p14="http://schemas.microsoft.com/office/powerpoint/2010/main" val="212342229"/>
+        <p14:creationId xmlns:p14="http://schemas.microsoft.com/office/powerpoint/2010/main" val="1858558517"/>
       </p:ext>
     </p:extLst>
   </p:cSld>
@@ -909,7 +911,7 @@
     </p:spTree>
     <p:extLst>
       <p:ext uri="{BB962C8B-B14F-4D97-AF65-F5344CB8AC3E}">
-        <p14:creationId xmlns:p14="http://schemas.microsoft.com/office/powerpoint/2010/main" val="1200451045"/>
+        <p14:creationId xmlns:p14="http://schemas.microsoft.com/office/powerpoint/2010/main" val="212342229"/>
       </p:ext>
     </p:extLst>
   </p:cSld>
@@ -997,7 +999,7 @@
     </p:spTree>
     <p:extLst>
       <p:ext uri="{BB962C8B-B14F-4D97-AF65-F5344CB8AC3E}">
-        <p14:creationId xmlns:p14="http://schemas.microsoft.com/office/powerpoint/2010/main" val="698314436"/>
+        <p14:creationId xmlns:p14="http://schemas.microsoft.com/office/powerpoint/2010/main" val="1200451045"/>
       </p:ext>
     </p:extLst>
   </p:cSld>
@@ -1085,7 +1087,7 @@
     </p:spTree>
     <p:extLst>
       <p:ext uri="{BB962C8B-B14F-4D97-AF65-F5344CB8AC3E}">
-        <p14:creationId xmlns:p14="http://schemas.microsoft.com/office/powerpoint/2010/main" val="625240534"/>
+        <p14:creationId xmlns:p14="http://schemas.microsoft.com/office/powerpoint/2010/main" val="698314436"/>
       </p:ext>
     </p:extLst>
   </p:cSld>
@@ -1165,6 +1167,512 @@
             <a:fld id="{5C949890-84D1-B346-997E-B43A2CF20212}" type="slidenum">
               <a:rPr lang="en-US" smtClean="0"/>
               <a:t>7</a:t>
+            </a:fld>
+            <a:endParaRPr lang="en-US"/>
+          </a:p>
+        </p:txBody>
+      </p:sp>
+    </p:spTree>
+    <p:extLst>
+      <p:ext uri="{BB962C8B-B14F-4D97-AF65-F5344CB8AC3E}">
+        <p14:creationId xmlns:p14="http://schemas.microsoft.com/office/powerpoint/2010/main" val="625240534"/>
+      </p:ext>
+    </p:extLst>
+  </p:cSld>
+  <p:clrMapOvr>
+    <a:masterClrMapping/>
+  </p:clrMapOvr>
+</p:notes>
+</file>
+
+<file path=ppt/notesSlides/notesSlide8.xml><?xml version="1.0" encoding="utf-8"?>
+<p:notes xmlns:a="http://schemas.openxmlformats.org/drawingml/2006/main" xmlns:r="http://schemas.openxmlformats.org/officeDocument/2006/relationships" xmlns:p="http://schemas.openxmlformats.org/presentationml/2006/main">
+  <p:cSld>
+    <p:spTree>
+      <p:nvGrpSpPr>
+        <p:cNvPr id="1" name=""/>
+        <p:cNvGrpSpPr/>
+        <p:nvPr/>
+      </p:nvGrpSpPr>
+      <p:grpSpPr>
+        <a:xfrm>
+          <a:off x="0" y="0"/>
+          <a:ext cx="0" cy="0"/>
+          <a:chOff x="0" y="0"/>
+          <a:chExt cx="0" cy="0"/>
+        </a:xfrm>
+      </p:grpSpPr>
+      <p:sp>
+        <p:nvSpPr>
+          <p:cNvPr id="2" name="Slide Image Placeholder 1"/>
+          <p:cNvSpPr>
+            <a:spLocks noGrp="1" noRot="1" noChangeAspect="1"/>
+          </p:cNvSpPr>
+          <p:nvPr>
+            <p:ph type="sldImg"/>
+          </p:nvPr>
+        </p:nvSpPr>
+        <p:spPr/>
+      </p:sp>
+      <p:sp>
+        <p:nvSpPr>
+          <p:cNvPr id="3" name="Notes Placeholder 2"/>
+          <p:cNvSpPr>
+            <a:spLocks noGrp="1"/>
+          </p:cNvSpPr>
+          <p:nvPr>
+            <p:ph type="body" idx="1"/>
+          </p:nvPr>
+        </p:nvSpPr>
+        <p:spPr/>
+        <p:txBody>
+          <a:bodyPr/>
+          <a:lstStyle/>
+          <a:p>
+            <a:pPr marL="171450" marR="0" indent="-171450" algn="l" defTabSz="914400" rtl="0" eaLnBrk="1" fontAlgn="auto" latinLnBrk="0" hangingPunct="1">
+              <a:lnSpc>
+                <a:spcPct val="100000"/>
+              </a:lnSpc>
+              <a:spcBef>
+                <a:spcPts val="0"/>
+              </a:spcBef>
+              <a:spcAft>
+                <a:spcPts val="0"/>
+              </a:spcAft>
+              <a:buClrTx/>
+              <a:buSzTx/>
+              <a:buFont typeface="Arial" charset="0"/>
+              <a:buChar char="•"/>
+              <a:tabLst/>
+              <a:defRPr/>
+            </a:pPr>
+            <a:r>
+              <a:rPr lang="en-US" b="0" dirty="0" smtClean="0"/>
+              <a:t>Contrived complexity</a:t>
+            </a:r>
+            <a:r>
+              <a:rPr lang="en-US" b="0" baseline="0" dirty="0" smtClean="0"/>
+              <a:t> </a:t>
+            </a:r>
+            <a:r>
+              <a:rPr lang="mr-IN" b="0" baseline="0" dirty="0" smtClean="0"/>
+              <a:t>–</a:t>
+            </a:r>
+            <a:r>
+              <a:rPr lang="en-US" b="0" baseline="0" dirty="0" smtClean="0"/>
+              <a:t> forced usage of overcomplicated design patterns</a:t>
+            </a:r>
+            <a:endParaRPr lang="en-US" b="0" dirty="0" smtClean="0"/>
+          </a:p>
+          <a:p>
+            <a:pPr marL="171450" marR="0" indent="-171450" algn="l" defTabSz="914400" rtl="0" eaLnBrk="1" fontAlgn="auto" latinLnBrk="0" hangingPunct="1">
+              <a:lnSpc>
+                <a:spcPct val="100000"/>
+              </a:lnSpc>
+              <a:spcBef>
+                <a:spcPts val="0"/>
+              </a:spcBef>
+              <a:spcAft>
+                <a:spcPts val="0"/>
+              </a:spcAft>
+              <a:buClrTx/>
+              <a:buSzTx/>
+              <a:buFont typeface="Arial" charset="0"/>
+              <a:buChar char="•"/>
+              <a:tabLst/>
+              <a:defRPr/>
+            </a:pPr>
+            <a:r>
+              <a:rPr lang="en-US" b="0" dirty="0" smtClean="0"/>
+              <a:t>Large class </a:t>
+            </a:r>
+            <a:r>
+              <a:rPr lang="mr-IN" b="0" dirty="0" smtClean="0"/>
+              <a:t>–</a:t>
+            </a:r>
+            <a:r>
+              <a:rPr lang="en-US" b="0" dirty="0" smtClean="0"/>
+              <a:t> a class that has grown too large</a:t>
+            </a:r>
+          </a:p>
+          <a:p>
+            <a:pPr marL="171450" marR="0" indent="-171450" algn="l" defTabSz="914400" rtl="0" eaLnBrk="1" fontAlgn="auto" latinLnBrk="0" hangingPunct="1">
+              <a:lnSpc>
+                <a:spcPct val="100000"/>
+              </a:lnSpc>
+              <a:spcBef>
+                <a:spcPts val="0"/>
+              </a:spcBef>
+              <a:spcAft>
+                <a:spcPts val="0"/>
+              </a:spcAft>
+              <a:buClrTx/>
+              <a:buSzTx/>
+              <a:buFont typeface="Arial" charset="0"/>
+              <a:buChar char="•"/>
+              <a:tabLst/>
+              <a:defRPr/>
+            </a:pPr>
+            <a:r>
+              <a:rPr lang="en-US" b="0" baseline="0" dirty="0" smtClean="0"/>
+              <a:t>Shotgun surgery </a:t>
+            </a:r>
+            <a:r>
+              <a:rPr lang="mr-IN" b="0" baseline="0" dirty="0" smtClean="0"/>
+              <a:t>–</a:t>
+            </a:r>
+            <a:r>
+              <a:rPr lang="en-US" b="0" baseline="0" dirty="0" smtClean="0"/>
+              <a:t> a single change needs to be applied to multiple classes at the same time</a:t>
+            </a:r>
+            <a:endParaRPr lang="en-US" sz="1200" b="0" i="0" kern="1200" baseline="0" dirty="0" smtClean="0">
+              <a:solidFill>
+                <a:schemeClr val="tx1"/>
+              </a:solidFill>
+              <a:effectLst/>
+              <a:latin typeface="+mn-lt"/>
+              <a:ea typeface="+mn-ea"/>
+              <a:cs typeface="+mn-cs"/>
+            </a:endParaRPr>
+          </a:p>
+          <a:p>
+            <a:pPr marL="171450" marR="0" indent="-171450" algn="l" defTabSz="914400" rtl="0" eaLnBrk="1" fontAlgn="auto" latinLnBrk="0" hangingPunct="1">
+              <a:lnSpc>
+                <a:spcPct val="100000"/>
+              </a:lnSpc>
+              <a:spcBef>
+                <a:spcPts val="0"/>
+              </a:spcBef>
+              <a:spcAft>
+                <a:spcPts val="0"/>
+              </a:spcAft>
+              <a:buClrTx/>
+              <a:buSzTx/>
+              <a:buFont typeface="Arial" charset="0"/>
+              <a:buChar char="•"/>
+              <a:tabLst/>
+              <a:defRPr/>
+            </a:pPr>
+            <a:r>
+              <a:rPr lang="en-US" sz="1200" b="0" i="0" kern="1200" baseline="0" dirty="0" smtClean="0">
+                <a:solidFill>
+                  <a:schemeClr val="tx1"/>
+                </a:solidFill>
+                <a:effectLst/>
+                <a:latin typeface="+mn-lt"/>
+                <a:ea typeface="+mn-ea"/>
+                <a:cs typeface="+mn-cs"/>
+              </a:rPr>
+              <a:t>Boat-anchoring </a:t>
+            </a:r>
+            <a:r>
+              <a:rPr lang="mr-IN" sz="1200" b="0" i="0" kern="1200" baseline="0" dirty="0" smtClean="0">
+                <a:solidFill>
+                  <a:schemeClr val="tx1"/>
+                </a:solidFill>
+                <a:effectLst/>
+                <a:latin typeface="+mn-lt"/>
+                <a:ea typeface="+mn-ea"/>
+                <a:cs typeface="+mn-cs"/>
+              </a:rPr>
+              <a:t>–</a:t>
+            </a:r>
+            <a:r>
+              <a:rPr lang="en-US" sz="1200" b="0" i="0" kern="1200" baseline="0" dirty="0" smtClean="0">
+                <a:solidFill>
+                  <a:schemeClr val="tx1"/>
+                </a:solidFill>
+                <a:effectLst/>
+                <a:latin typeface="+mn-lt"/>
+                <a:ea typeface="+mn-ea"/>
+                <a:cs typeface="+mn-cs"/>
+              </a:rPr>
+              <a:t> A</a:t>
+            </a:r>
+            <a:r>
+              <a:rPr lang="en-US" sz="1200" b="0" i="0" kern="1200" dirty="0" smtClean="0">
+                <a:solidFill>
+                  <a:schemeClr val="tx1"/>
+                </a:solidFill>
+                <a:effectLst/>
+                <a:latin typeface="+mn-lt"/>
+                <a:ea typeface="+mn-ea"/>
+                <a:cs typeface="+mn-cs"/>
+              </a:rPr>
+              <a:t> piece of software or hardware that serves no purpose on the current project</a:t>
+            </a:r>
+          </a:p>
+          <a:p>
+            <a:pPr marL="171450" marR="0" indent="-171450" algn="l" defTabSz="914400" rtl="0" eaLnBrk="1" fontAlgn="auto" latinLnBrk="0" hangingPunct="1">
+              <a:lnSpc>
+                <a:spcPct val="100000"/>
+              </a:lnSpc>
+              <a:spcBef>
+                <a:spcPts val="0"/>
+              </a:spcBef>
+              <a:spcAft>
+                <a:spcPts val="0"/>
+              </a:spcAft>
+              <a:buClrTx/>
+              <a:buSzTx/>
+              <a:buFont typeface="Arial" charset="0"/>
+              <a:buChar char="•"/>
+              <a:tabLst/>
+              <a:defRPr/>
+            </a:pPr>
+            <a:r>
+              <a:rPr lang="en-US" b="0" dirty="0" smtClean="0"/>
+              <a:t>Cyclomatic complexity </a:t>
+            </a:r>
+            <a:r>
+              <a:rPr lang="mr-IN" b="0" dirty="0" smtClean="0"/>
+              <a:t>–</a:t>
+            </a:r>
+            <a:r>
+              <a:rPr lang="en-US" b="0" dirty="0" smtClean="0"/>
+              <a:t> too many branches or loops</a:t>
+            </a:r>
+          </a:p>
+          <a:p>
+            <a:pPr marL="171450" marR="0" indent="-171450" algn="l" defTabSz="914400" rtl="0" eaLnBrk="1" fontAlgn="auto" latinLnBrk="0" hangingPunct="1">
+              <a:lnSpc>
+                <a:spcPct val="100000"/>
+              </a:lnSpc>
+              <a:spcBef>
+                <a:spcPts val="0"/>
+              </a:spcBef>
+              <a:spcAft>
+                <a:spcPts val="0"/>
+              </a:spcAft>
+              <a:buClrTx/>
+              <a:buSzTx/>
+              <a:buFont typeface="Arial" charset="0"/>
+              <a:buChar char="•"/>
+              <a:tabLst/>
+              <a:defRPr/>
+            </a:pPr>
+            <a:endParaRPr lang="en-US" b="0" dirty="0" smtClean="0"/>
+          </a:p>
+          <a:p>
+            <a:pPr marL="0" marR="0" indent="0" algn="l" defTabSz="914400" rtl="0" eaLnBrk="1" fontAlgn="auto" latinLnBrk="0" hangingPunct="1">
+              <a:lnSpc>
+                <a:spcPct val="100000"/>
+              </a:lnSpc>
+              <a:spcBef>
+                <a:spcPts val="0"/>
+              </a:spcBef>
+              <a:spcAft>
+                <a:spcPts val="0"/>
+              </a:spcAft>
+              <a:buClrTx/>
+              <a:buSzTx/>
+              <a:buFont typeface="Arial" charset="0"/>
+              <a:buNone/>
+              <a:tabLst/>
+              <a:defRPr/>
+            </a:pPr>
+            <a:r>
+              <a:rPr lang="en-US" b="0" dirty="0" smtClean="0"/>
+              <a:t>Others</a:t>
+            </a:r>
+            <a:r>
+              <a:rPr lang="en-US" b="0" baseline="0" dirty="0" smtClean="0"/>
+              <a:t> to consider:</a:t>
+            </a:r>
+          </a:p>
+          <a:p>
+            <a:pPr marL="171450" indent="-171450">
+              <a:buFont typeface="Arial" charset="0"/>
+              <a:buChar char="•"/>
+            </a:pPr>
+            <a:r>
+              <a:rPr lang="en-US" b="0" baseline="0" dirty="0" smtClean="0"/>
+              <a:t>Dead code </a:t>
+            </a:r>
+            <a:r>
+              <a:rPr lang="mr-IN" b="0" baseline="0" dirty="0" smtClean="0"/>
+              <a:t>–</a:t>
+            </a:r>
+            <a:r>
+              <a:rPr lang="en-US" b="0" baseline="0" dirty="0" smtClean="0"/>
+              <a:t> remove commented code before you push to a version control system</a:t>
+            </a:r>
+          </a:p>
+          <a:p>
+            <a:pPr marL="171450" indent="-171450">
+              <a:buFont typeface="Arial" charset="0"/>
+              <a:buChar char="•"/>
+            </a:pPr>
+            <a:r>
+              <a:rPr lang="en-US" b="0" baseline="0" dirty="0" smtClean="0"/>
+              <a:t>Comments </a:t>
+            </a:r>
+            <a:r>
+              <a:rPr lang="mr-IN" b="0" baseline="0" dirty="0" smtClean="0"/>
+              <a:t>–</a:t>
+            </a:r>
+            <a:r>
+              <a:rPr lang="en-US" b="0" baseline="0" dirty="0" smtClean="0"/>
+              <a:t> often used to hide the smell. “Comments are often used as deodorants”</a:t>
+            </a:r>
+          </a:p>
+          <a:p>
+            <a:pPr marL="171450" marR="0" indent="-171450" algn="l" defTabSz="914400" rtl="0" eaLnBrk="1" fontAlgn="auto" latinLnBrk="0" hangingPunct="1">
+              <a:lnSpc>
+                <a:spcPct val="100000"/>
+              </a:lnSpc>
+              <a:spcBef>
+                <a:spcPts val="0"/>
+              </a:spcBef>
+              <a:spcAft>
+                <a:spcPts val="0"/>
+              </a:spcAft>
+              <a:buClrTx/>
+              <a:buSzTx/>
+              <a:buFont typeface="Arial" charset="0"/>
+              <a:buChar char="•"/>
+              <a:tabLst/>
+              <a:defRPr/>
+            </a:pPr>
+            <a:r>
+              <a:rPr lang="en-US" b="0" dirty="0" smtClean="0"/>
+              <a:t>Excessive use of literals </a:t>
+            </a:r>
+            <a:r>
+              <a:rPr lang="mr-IN" b="0" dirty="0" smtClean="0"/>
+              <a:t>–</a:t>
+            </a:r>
+            <a:r>
+              <a:rPr lang="en-US" b="0" dirty="0" smtClean="0"/>
+              <a:t> should</a:t>
+            </a:r>
+            <a:r>
+              <a:rPr lang="en-US" b="0" baseline="0" dirty="0" smtClean="0"/>
+              <a:t> be named constants, to improve readability and maintainability</a:t>
+            </a:r>
+            <a:endParaRPr lang="en-US" b="0" dirty="0" smtClean="0"/>
+          </a:p>
+          <a:p>
+            <a:pPr marL="171450" marR="0" indent="-171450" algn="l" defTabSz="914400" rtl="0" eaLnBrk="1" fontAlgn="auto" latinLnBrk="0" hangingPunct="1">
+              <a:lnSpc>
+                <a:spcPct val="100000"/>
+              </a:lnSpc>
+              <a:spcBef>
+                <a:spcPts val="0"/>
+              </a:spcBef>
+              <a:spcAft>
+                <a:spcPts val="0"/>
+              </a:spcAft>
+              <a:buClrTx/>
+              <a:buSzTx/>
+              <a:buFont typeface="Arial" charset="0"/>
+              <a:buChar char="•"/>
+              <a:tabLst/>
+              <a:defRPr/>
+            </a:pPr>
+            <a:r>
+              <a:rPr lang="en-US" b="0" dirty="0" smtClean="0"/>
+              <a:t>Too many parameters </a:t>
+            </a:r>
+            <a:r>
+              <a:rPr lang="mr-IN" b="0" dirty="0" smtClean="0"/>
+              <a:t>–</a:t>
+            </a:r>
+            <a:r>
+              <a:rPr lang="en-US" b="0" dirty="0" smtClean="0"/>
+              <a:t> a long list of parameters</a:t>
+            </a:r>
+          </a:p>
+          <a:p>
+            <a:pPr marL="171450" marR="0" lvl="2" indent="-171450" algn="l" defTabSz="914400" rtl="0" eaLnBrk="1" fontAlgn="auto" latinLnBrk="0" hangingPunct="1">
+              <a:lnSpc>
+                <a:spcPct val="100000"/>
+              </a:lnSpc>
+              <a:spcBef>
+                <a:spcPts val="0"/>
+              </a:spcBef>
+              <a:spcAft>
+                <a:spcPts val="0"/>
+              </a:spcAft>
+              <a:buClrTx/>
+              <a:buSzTx/>
+              <a:buFont typeface="Arial" charset="0"/>
+              <a:buChar char="•"/>
+              <a:tabLst/>
+              <a:defRPr/>
+            </a:pPr>
+            <a:r>
+              <a:rPr lang="en-US" sz="2500" dirty="0" smtClean="0"/>
+              <a:t>Copy and pasting programming</a:t>
+            </a:r>
+            <a:endParaRPr lang="en-US" sz="1200" b="0" i="0" kern="1200" baseline="0" dirty="0" smtClean="0">
+              <a:solidFill>
+                <a:schemeClr val="tx1"/>
+              </a:solidFill>
+              <a:effectLst/>
+              <a:latin typeface="+mn-lt"/>
+              <a:ea typeface="+mn-ea"/>
+              <a:cs typeface="+mn-cs"/>
+            </a:endParaRPr>
+          </a:p>
+          <a:p>
+            <a:pPr marL="171450" marR="0" indent="-171450" algn="l" defTabSz="914400" rtl="0" eaLnBrk="1" fontAlgn="auto" latinLnBrk="0" hangingPunct="1">
+              <a:lnSpc>
+                <a:spcPct val="100000"/>
+              </a:lnSpc>
+              <a:spcBef>
+                <a:spcPts val="0"/>
+              </a:spcBef>
+              <a:spcAft>
+                <a:spcPts val="0"/>
+              </a:spcAft>
+              <a:buClrTx/>
+              <a:buSzTx/>
+              <a:buFont typeface="Arial" charset="0"/>
+              <a:buChar char="•"/>
+              <a:tabLst/>
+              <a:defRPr/>
+            </a:pPr>
+            <a:r>
+              <a:rPr lang="en-US" sz="1200" b="0" i="0" kern="1200" baseline="0" dirty="0" smtClean="0">
+                <a:solidFill>
+                  <a:schemeClr val="tx1"/>
+                </a:solidFill>
+                <a:effectLst/>
+                <a:latin typeface="+mn-lt"/>
+                <a:ea typeface="+mn-ea"/>
+                <a:cs typeface="+mn-cs"/>
+              </a:rPr>
+              <a:t>Spaghetti code</a:t>
+            </a:r>
+          </a:p>
+          <a:p>
+            <a:pPr marL="171450" indent="-171450">
+              <a:buFont typeface="Arial" charset="0"/>
+              <a:buChar char="•"/>
+            </a:pPr>
+            <a:endParaRPr lang="en-US" baseline="0" dirty="0" smtClean="0"/>
+          </a:p>
+        </p:txBody>
+      </p:sp>
+      <p:sp>
+        <p:nvSpPr>
+          <p:cNvPr id="4" name="Slide Number Placeholder 3"/>
+          <p:cNvSpPr>
+            <a:spLocks noGrp="1"/>
+          </p:cNvSpPr>
+          <p:nvPr>
+            <p:ph type="sldNum" sz="quarter" idx="10"/>
+          </p:nvPr>
+        </p:nvSpPr>
+        <p:spPr/>
+        <p:txBody>
+          <a:bodyPr/>
+          <a:lstStyle/>
+          <a:p>
+            <a:fld id="{5C949890-84D1-B346-997E-B43A2CF20212}" type="slidenum">
+              <a:rPr lang="en-US" smtClean="0"/>
+              <a:t>8</a:t>
             </a:fld>
             <a:endParaRPr lang="en-US"/>
           </a:p>
@@ -1314,7 +1822,7 @@
           <a:p>
             <a:fld id="{BD4CA122-8521-6D44-9B67-558DC60F8753}" type="datetimeFigureOut">
               <a:rPr lang="en-US" smtClean="0"/>
-              <a:t>6/10/19</a:t>
+              <a:t>6/11/19</a:t>
             </a:fld>
             <a:endParaRPr lang="en-US"/>
           </a:p>
@@ -1484,7 +1992,7 @@
           <a:p>
             <a:fld id="{BD4CA122-8521-6D44-9B67-558DC60F8753}" type="datetimeFigureOut">
               <a:rPr lang="en-US" smtClean="0"/>
-              <a:t>6/10/19</a:t>
+              <a:t>6/11/19</a:t>
             </a:fld>
             <a:endParaRPr lang="en-US"/>
           </a:p>
@@ -1664,7 +2172,7 @@
           <a:p>
             <a:fld id="{BD4CA122-8521-6D44-9B67-558DC60F8753}" type="datetimeFigureOut">
               <a:rPr lang="en-US" smtClean="0"/>
-              <a:t>6/10/19</a:t>
+              <a:t>6/11/19</a:t>
             </a:fld>
             <a:endParaRPr lang="en-US"/>
           </a:p>
@@ -1834,7 +2342,7 @@
           <a:p>
             <a:fld id="{BD4CA122-8521-6D44-9B67-558DC60F8753}" type="datetimeFigureOut">
               <a:rPr lang="en-US" smtClean="0"/>
-              <a:t>6/10/19</a:t>
+              <a:t>6/11/19</a:t>
             </a:fld>
             <a:endParaRPr lang="en-US"/>
           </a:p>
@@ -2080,7 +2588,7 @@
           <a:p>
             <a:fld id="{BD4CA122-8521-6D44-9B67-558DC60F8753}" type="datetimeFigureOut">
               <a:rPr lang="en-US" smtClean="0"/>
-              <a:t>6/10/19</a:t>
+              <a:t>6/11/19</a:t>
             </a:fld>
             <a:endParaRPr lang="en-US"/>
           </a:p>
@@ -2312,7 +2820,7 @@
           <a:p>
             <a:fld id="{BD4CA122-8521-6D44-9B67-558DC60F8753}" type="datetimeFigureOut">
               <a:rPr lang="en-US" smtClean="0"/>
-              <a:t>6/10/19</a:t>
+              <a:t>6/11/19</a:t>
             </a:fld>
             <a:endParaRPr lang="en-US"/>
           </a:p>
@@ -2679,7 +3187,7 @@
           <a:p>
             <a:fld id="{BD4CA122-8521-6D44-9B67-558DC60F8753}" type="datetimeFigureOut">
               <a:rPr lang="en-US" smtClean="0"/>
-              <a:t>6/10/19</a:t>
+              <a:t>6/11/19</a:t>
             </a:fld>
             <a:endParaRPr lang="en-US"/>
           </a:p>
@@ -2797,7 +3305,7 @@
           <a:p>
             <a:fld id="{BD4CA122-8521-6D44-9B67-558DC60F8753}" type="datetimeFigureOut">
               <a:rPr lang="en-US" smtClean="0"/>
-              <a:t>6/10/19</a:t>
+              <a:t>6/11/19</a:t>
             </a:fld>
             <a:endParaRPr lang="en-US"/>
           </a:p>
@@ -2892,7 +3400,7 @@
           <a:p>
             <a:fld id="{BD4CA122-8521-6D44-9B67-558DC60F8753}" type="datetimeFigureOut">
               <a:rPr lang="en-US" smtClean="0"/>
-              <a:t>6/10/19</a:t>
+              <a:t>6/11/19</a:t>
             </a:fld>
             <a:endParaRPr lang="en-US"/>
           </a:p>
@@ -3169,7 +3677,7 @@
           <a:p>
             <a:fld id="{BD4CA122-8521-6D44-9B67-558DC60F8753}" type="datetimeFigureOut">
               <a:rPr lang="en-US" smtClean="0"/>
-              <a:t>6/10/19</a:t>
+              <a:t>6/11/19</a:t>
             </a:fld>
             <a:endParaRPr lang="en-US"/>
           </a:p>
@@ -3422,7 +3930,7 @@
           <a:p>
             <a:fld id="{BD4CA122-8521-6D44-9B67-558DC60F8753}" type="datetimeFigureOut">
               <a:rPr lang="en-US" smtClean="0"/>
-              <a:t>6/10/19</a:t>
+              <a:t>6/11/19</a:t>
             </a:fld>
             <a:endParaRPr lang="en-US"/>
           </a:p>
@@ -3635,7 +4143,7 @@
           <a:p>
             <a:fld id="{BD4CA122-8521-6D44-9B67-558DC60F8753}" type="datetimeFigureOut">
               <a:rPr lang="en-US" smtClean="0"/>
-              <a:t>6/10/19</a:t>
+              <a:t>6/11/19</a:t>
             </a:fld>
             <a:endParaRPr lang="en-US"/>
           </a:p>
@@ -4075,8 +4583,12 @@
           <a:p>
             <a:pPr algn="ctr"/>
             <a:r>
+              <a:rPr lang="en-US" sz="3800" b="1" smtClean="0"/>
+              <a:t>Object-Oriented </a:t>
+            </a:r>
+            <a:r>
               <a:rPr lang="en-US" sz="3800" b="1" dirty="0"/>
-              <a:t>Object Oriented System Development</a:t>
+              <a:t>System Development</a:t>
             </a:r>
           </a:p>
           <a:p>
@@ -4184,7 +4696,7 @@
         <p:spPr>
           <a:xfrm>
             <a:off x="0" y="1299607"/>
-            <a:ext cx="12192000" cy="1646605"/>
+            <a:ext cx="12192000" cy="5109091"/>
           </a:xfrm>
           <a:prstGeom prst="rect">
             <a:avLst/>
@@ -4203,7 +4715,7 @@
             </a:r>
             <a:r>
               <a:rPr lang="en-US" sz="3800" b="1" dirty="0" smtClean="0"/>
-              <a:t>Map, filter, reduce and lambda</a:t>
+              <a:t>Design patterns</a:t>
             </a:r>
           </a:p>
           <a:p>
@@ -4214,7 +4726,100 @@
               <a:buFont typeface="Arial" charset="0"/>
               <a:buChar char="•"/>
             </a:pPr>
-            <a:endParaRPr lang="en-US" sz="2500" dirty="0" smtClean="0"/>
+            <a:r>
+              <a:rPr lang="en-US" sz="2500" dirty="0" smtClean="0"/>
+              <a:t>Abstract factory</a:t>
+            </a:r>
+          </a:p>
+          <a:p>
+            <a:pPr marL="1485900" lvl="2" indent="-571500">
+              <a:buFont typeface="Arial" charset="0"/>
+              <a:buChar char="•"/>
+            </a:pPr>
+            <a:r>
+              <a:rPr lang="en-US" sz="2500" dirty="0" smtClean="0"/>
+              <a:t>Adapter</a:t>
+            </a:r>
+          </a:p>
+          <a:p>
+            <a:pPr marL="1485900" lvl="2" indent="-571500">
+              <a:buFont typeface="Arial" charset="0"/>
+              <a:buChar char="•"/>
+            </a:pPr>
+            <a:r>
+              <a:rPr lang="en-US" sz="2500" dirty="0" smtClean="0"/>
+              <a:t>Builder</a:t>
+            </a:r>
+          </a:p>
+          <a:p>
+            <a:pPr marL="1485900" lvl="2" indent="-571500">
+              <a:buFont typeface="Arial" charset="0"/>
+              <a:buChar char="•"/>
+            </a:pPr>
+            <a:r>
+              <a:rPr lang="en-US" sz="2500" dirty="0" smtClean="0"/>
+              <a:t>Command</a:t>
+            </a:r>
+          </a:p>
+          <a:p>
+            <a:pPr marL="1485900" lvl="2" indent="-571500">
+              <a:buFont typeface="Arial" charset="0"/>
+              <a:buChar char="•"/>
+            </a:pPr>
+            <a:r>
+              <a:rPr lang="en-US" sz="2500" dirty="0" smtClean="0"/>
+              <a:t>Decorator</a:t>
+            </a:r>
+          </a:p>
+          <a:p>
+            <a:pPr marL="1485900" lvl="2" indent="-571500">
+              <a:buFont typeface="Arial" charset="0"/>
+              <a:buChar char="•"/>
+            </a:pPr>
+            <a:r>
+              <a:rPr lang="en-US" sz="2500" dirty="0" smtClean="0"/>
+              <a:t>Observer</a:t>
+            </a:r>
+          </a:p>
+          <a:p>
+            <a:pPr marL="1485900" lvl="2" indent="-571500">
+              <a:buFont typeface="Arial" charset="0"/>
+              <a:buChar char="•"/>
+            </a:pPr>
+            <a:r>
+              <a:rPr lang="en-US" sz="2500" dirty="0" smtClean="0"/>
+              <a:t>Simple factory</a:t>
+            </a:r>
+          </a:p>
+          <a:p>
+            <a:pPr marL="1485900" lvl="2" indent="-571500">
+              <a:buFont typeface="Arial" charset="0"/>
+              <a:buChar char="•"/>
+            </a:pPr>
+            <a:r>
+              <a:rPr lang="en-US" sz="2500" dirty="0" smtClean="0"/>
+              <a:t>Singleton</a:t>
+            </a:r>
+          </a:p>
+          <a:p>
+            <a:pPr marL="1485900" lvl="2" indent="-571500">
+              <a:buFont typeface="Arial" charset="0"/>
+              <a:buChar char="•"/>
+            </a:pPr>
+            <a:r>
+              <a:rPr lang="en-US" sz="2500" dirty="0" smtClean="0"/>
+              <a:t>Strategy</a:t>
+            </a:r>
+          </a:p>
+          <a:p>
+            <a:pPr marL="1485900" lvl="2" indent="-571500">
+              <a:buFont typeface="Arial" charset="0"/>
+              <a:buChar char="•"/>
+            </a:pPr>
+            <a:r>
+              <a:rPr lang="en-US" sz="2500" dirty="0" smtClean="0"/>
+              <a:t>Template</a:t>
+            </a:r>
           </a:p>
         </p:txBody>
       </p:sp>
@@ -4298,7 +4903,7 @@
         <p:spPr>
           <a:xfrm>
             <a:off x="0" y="1299607"/>
-            <a:ext cx="12192000" cy="1646605"/>
+            <a:ext cx="12192000" cy="3185487"/>
           </a:xfrm>
           <a:prstGeom prst="rect">
             <a:avLst/>
@@ -4317,7 +4922,7 @@
             </a:r>
             <a:r>
               <a:rPr lang="en-US" sz="3800" b="1" dirty="0" smtClean="0"/>
-              <a:t>SOLID principles</a:t>
+              <a:t>Map, filter, reduce and lambda</a:t>
             </a:r>
           </a:p>
           <a:p>
@@ -4328,14 +4933,76 @@
               <a:buFont typeface="Arial" charset="0"/>
               <a:buChar char="•"/>
             </a:pPr>
+            <a:r>
+              <a:rPr lang="en-US" sz="2500" dirty="0" smtClean="0"/>
+              <a:t>Simply imperative code into an expression</a:t>
+            </a:r>
+          </a:p>
+          <a:p>
+            <a:pPr marL="1485900" lvl="2" indent="-571500">
+              <a:buFont typeface="Arial" charset="0"/>
+              <a:buChar char="•"/>
+            </a:pPr>
+            <a:r>
+              <a:rPr lang="en-US" sz="2500" dirty="0"/>
+              <a:t>Write a map and lambda function that adds two list of numbers together and returns a single list of </a:t>
+            </a:r>
+            <a:r>
+              <a:rPr lang="en-US" sz="2500" dirty="0" smtClean="0"/>
+              <a:t>numbers</a:t>
+            </a:r>
+            <a:endParaRPr lang="en-US" sz="2500" dirty="0"/>
+          </a:p>
+          <a:p>
+            <a:pPr marL="1485900" lvl="2" indent="-571500">
+              <a:buFont typeface="Arial" charset="0"/>
+              <a:buChar char="•"/>
+            </a:pPr>
             <a:endParaRPr lang="en-US" sz="2500" dirty="0" smtClean="0"/>
           </a:p>
-        </p:txBody>
-      </p:sp>
+          <a:p>
+            <a:pPr marL="1485900" lvl="2" indent="-571500">
+              <a:buFont typeface="Arial" charset="0"/>
+              <a:buChar char="•"/>
+            </a:pPr>
+            <a:endParaRPr lang="en-US" sz="2500" dirty="0"/>
+          </a:p>
+        </p:txBody>
+      </p:sp>
+      <p:pic>
+        <p:nvPicPr>
+          <p:cNvPr id="4" name="Picture 3"/>
+          <p:cNvPicPr>
+            <a:picLocks noChangeAspect="1"/>
+          </p:cNvPicPr>
+          <p:nvPr/>
+        </p:nvPicPr>
+        <p:blipFill>
+          <a:blip r:embed="rId3">
+            <a:extLst>
+              <a:ext uri="{28A0092B-C50C-407E-A947-70E740481C1C}">
+                <a14:useLocalDpi xmlns:a14="http://schemas.microsoft.com/office/drawing/2010/main" val="0"/>
+              </a:ext>
+            </a:extLst>
+          </a:blip>
+          <a:stretch>
+            <a:fillRect/>
+          </a:stretch>
+        </p:blipFill>
+        <p:spPr>
+          <a:xfrm>
+            <a:off x="4002575" y="3991614"/>
+            <a:ext cx="4113825" cy="1704053"/>
+          </a:xfrm>
+          <a:prstGeom prst="rect">
+            <a:avLst/>
+          </a:prstGeom>
+        </p:spPr>
+      </p:pic>
     </p:spTree>
     <p:extLst>
       <p:ext uri="{BB962C8B-B14F-4D97-AF65-F5344CB8AC3E}">
-        <p14:creationId xmlns:p14="http://schemas.microsoft.com/office/powerpoint/2010/main" val="863887028"/>
+        <p14:creationId xmlns:p14="http://schemas.microsoft.com/office/powerpoint/2010/main" val="1269664787"/>
       </p:ext>
     </p:extLst>
   </p:cSld>
@@ -4412,7 +5079,7 @@
         <p:spPr>
           <a:xfrm>
             <a:off x="0" y="1299607"/>
-            <a:ext cx="12192000" cy="1646605"/>
+            <a:ext cx="12192000" cy="5570756"/>
           </a:xfrm>
           <a:prstGeom prst="rect">
             <a:avLst/>
@@ -4431,11 +5098,132 @@
             </a:r>
             <a:r>
               <a:rPr lang="en-US" sz="3800" b="1" dirty="0" smtClean="0"/>
-              <a:t>Django</a:t>
+              <a:t>SOLID principles</a:t>
             </a:r>
           </a:p>
           <a:p>
             <a:endParaRPr lang="en-US" sz="3800" b="1" dirty="0"/>
+          </a:p>
+          <a:p>
+            <a:pPr marL="1485900" lvl="2" indent="-571500">
+              <a:buFont typeface="Arial" charset="0"/>
+              <a:buChar char="•"/>
+            </a:pPr>
+            <a:r>
+              <a:rPr lang="en-US" sz="2500" dirty="0" smtClean="0"/>
+              <a:t>Identify code breaking SOLID principles</a:t>
+            </a:r>
+          </a:p>
+          <a:p>
+            <a:pPr marL="1485900" lvl="2" indent="-571500">
+              <a:buFont typeface="Arial" charset="0"/>
+              <a:buChar char="•"/>
+            </a:pPr>
+            <a:r>
+              <a:rPr lang="en-US" sz="2500" dirty="0" smtClean="0"/>
+              <a:t>Single responsibility</a:t>
+            </a:r>
+          </a:p>
+          <a:p>
+            <a:pPr marL="1943100" lvl="3" indent="-571500">
+              <a:buFont typeface="Arial" charset="0"/>
+              <a:buChar char="•"/>
+            </a:pPr>
+            <a:r>
+              <a:rPr lang="en-US" sz="2000" dirty="0"/>
+              <a:t>A class should have one, and only one, reason to </a:t>
+            </a:r>
+            <a:r>
+              <a:rPr lang="en-US" sz="2000" dirty="0" smtClean="0"/>
+              <a:t>change</a:t>
+            </a:r>
+          </a:p>
+          <a:p>
+            <a:pPr marL="1485900" lvl="2" indent="-571500">
+              <a:buFont typeface="Arial" charset="0"/>
+              <a:buChar char="•"/>
+            </a:pPr>
+            <a:r>
+              <a:rPr lang="en-US" sz="2500" dirty="0" smtClean="0"/>
+              <a:t>Open-closed</a:t>
+            </a:r>
+          </a:p>
+          <a:p>
+            <a:pPr marL="1943100" lvl="3" indent="-571500">
+              <a:buFont typeface="Arial" charset="0"/>
+              <a:buChar char="•"/>
+            </a:pPr>
+            <a:r>
+              <a:rPr lang="en-US" sz="2000" dirty="0"/>
+              <a:t>You should be able to extend a class’s behavior, without modifying it</a:t>
+            </a:r>
+            <a:endParaRPr lang="en-US" sz="2000" dirty="0" smtClean="0"/>
+          </a:p>
+          <a:p>
+            <a:pPr marL="1485900" lvl="2" indent="-571500">
+              <a:buFont typeface="Arial" charset="0"/>
+              <a:buChar char="•"/>
+            </a:pPr>
+            <a:r>
+              <a:rPr lang="en-US" sz="2500" dirty="0" smtClean="0"/>
+              <a:t>Liskov substitution</a:t>
+            </a:r>
+          </a:p>
+          <a:p>
+            <a:pPr marL="1943100" lvl="3" indent="-571500">
+              <a:buFont typeface="Arial" charset="0"/>
+              <a:buChar char="•"/>
+            </a:pPr>
+            <a:r>
+              <a:rPr lang="en-US" sz="2000" dirty="0"/>
+              <a:t>Derived classes must be substitutable for their base classes</a:t>
+            </a:r>
+            <a:endParaRPr lang="en-US" sz="2000" dirty="0" smtClean="0"/>
+          </a:p>
+          <a:p>
+            <a:pPr marL="1485900" lvl="2" indent="-571500">
+              <a:buFont typeface="Arial" charset="0"/>
+              <a:buChar char="•"/>
+            </a:pPr>
+            <a:r>
+              <a:rPr lang="en-US" sz="2500" dirty="0"/>
+              <a:t>Interface </a:t>
+            </a:r>
+            <a:r>
+              <a:rPr lang="en-US" sz="2500" dirty="0" smtClean="0"/>
+              <a:t>segregation</a:t>
+            </a:r>
+          </a:p>
+          <a:p>
+            <a:pPr marL="1943100" lvl="3" indent="-571500">
+              <a:buFont typeface="Arial" charset="0"/>
+              <a:buChar char="•"/>
+            </a:pPr>
+            <a:r>
+              <a:rPr lang="en-US" sz="2000" dirty="0"/>
+              <a:t>Make fine grained interfaces that are client specific</a:t>
+            </a:r>
+          </a:p>
+          <a:p>
+            <a:pPr marL="1485900" lvl="2" indent="-571500">
+              <a:buFont typeface="Arial" charset="0"/>
+              <a:buChar char="•"/>
+            </a:pPr>
+            <a:r>
+              <a:rPr lang="en-US" sz="2500" dirty="0" smtClean="0"/>
+              <a:t>Dependency inversion</a:t>
+            </a:r>
+          </a:p>
+          <a:p>
+            <a:pPr marL="1943100" lvl="3" indent="-571500">
+              <a:buFont typeface="Arial" charset="0"/>
+              <a:buChar char="•"/>
+            </a:pPr>
+            <a:r>
+              <a:rPr lang="en-US" sz="2000" dirty="0"/>
+              <a:t>Depend on abstractions, not on concretions</a:t>
+            </a:r>
+            <a:endParaRPr lang="en-US" sz="2000" dirty="0" smtClean="0"/>
           </a:p>
           <a:p>
             <a:pPr marL="1485900" lvl="2" indent="-571500">
@@ -4449,7 +5237,7 @@
     </p:spTree>
     <p:extLst>
       <p:ext uri="{BB962C8B-B14F-4D97-AF65-F5344CB8AC3E}">
-        <p14:creationId xmlns:p14="http://schemas.microsoft.com/office/powerpoint/2010/main" val="843118793"/>
+        <p14:creationId xmlns:p14="http://schemas.microsoft.com/office/powerpoint/2010/main" val="863887028"/>
       </p:ext>
     </p:extLst>
   </p:cSld>
@@ -4545,9 +5333,8 @@
             </a:r>
             <a:r>
               <a:rPr lang="en-US" sz="3800" b="1" dirty="0" smtClean="0"/>
-              <a:t>Unit and E2E Testing</a:t>
-            </a:r>
-            <a:endParaRPr lang="en-US" sz="3800" b="1" dirty="0" smtClean="0"/>
+              <a:t>Django</a:t>
+            </a:r>
           </a:p>
           <a:p>
             <a:endParaRPr lang="en-US" sz="3800" b="1" dirty="0"/>
@@ -4557,14 +5344,46 @@
               <a:buFont typeface="Arial" charset="0"/>
               <a:buChar char="•"/>
             </a:pPr>
+            <a:r>
+              <a:rPr lang="en-US" sz="2500" dirty="0" smtClean="0"/>
+              <a:t>Query a Django model</a:t>
+            </a:r>
             <a:endParaRPr lang="en-US" sz="2500" dirty="0" smtClean="0"/>
           </a:p>
         </p:txBody>
       </p:sp>
+      <p:pic>
+        <p:nvPicPr>
+          <p:cNvPr id="4" name="Picture 3"/>
+          <p:cNvPicPr/>
+          <p:nvPr/>
+        </p:nvPicPr>
+        <p:blipFill>
+          <a:blip r:embed="rId3">
+            <a:extLst>
+              <a:ext uri="{28A0092B-C50C-407E-A947-70E740481C1C}">
+                <a14:useLocalDpi xmlns:a14="http://schemas.microsoft.com/office/drawing/2010/main" val="0"/>
+              </a:ext>
+            </a:extLst>
+          </a:blip>
+          <a:stretch>
+            <a:fillRect/>
+          </a:stretch>
+        </p:blipFill>
+        <p:spPr>
+          <a:xfrm>
+            <a:off x="3162178" y="3465513"/>
+            <a:ext cx="5867643" cy="2789104"/>
+          </a:xfrm>
+          <a:prstGeom prst="rect">
+            <a:avLst/>
+          </a:prstGeom>
+        </p:spPr>
+      </p:pic>
     </p:spTree>
     <p:extLst>
       <p:ext uri="{BB962C8B-B14F-4D97-AF65-F5344CB8AC3E}">
-        <p14:creationId xmlns:p14="http://schemas.microsoft.com/office/powerpoint/2010/main" val="1313805270"/>
+        <p14:creationId xmlns:p14="http://schemas.microsoft.com/office/powerpoint/2010/main" val="843118793"/>
       </p:ext>
     </p:extLst>
   </p:cSld>
@@ -4660,7 +5479,7 @@
             </a:r>
             <a:r>
               <a:rPr lang="en-US" sz="3800" b="1" dirty="0" smtClean="0"/>
-              <a:t>Exception handling</a:t>
+              <a:t>Unit and E2E Testing</a:t>
             </a:r>
           </a:p>
           <a:p>
@@ -4671,14 +5490,48 @@
               <a:buFont typeface="Arial" charset="0"/>
               <a:buChar char="•"/>
             </a:pPr>
+            <a:r>
+              <a:rPr lang="en-US" sz="2500" dirty="0" smtClean="0"/>
+              <a:t>Correctly setup and write a unit test and e2e test</a:t>
+            </a:r>
             <a:endParaRPr lang="en-US" sz="2500" dirty="0" smtClean="0"/>
           </a:p>
         </p:txBody>
       </p:sp>
+      <p:pic>
+        <p:nvPicPr>
+          <p:cNvPr id="2" name="Picture 1"/>
+          <p:cNvPicPr>
+            <a:picLocks noChangeAspect="1"/>
+          </p:cNvPicPr>
+          <p:nvPr/>
+        </p:nvPicPr>
+        <p:blipFill>
+          <a:blip r:embed="rId3">
+            <a:extLst>
+              <a:ext uri="{28A0092B-C50C-407E-A947-70E740481C1C}">
+                <a14:useLocalDpi xmlns:a14="http://schemas.microsoft.com/office/drawing/2010/main" val="0"/>
+              </a:ext>
+            </a:extLst>
+          </a:blip>
+          <a:stretch>
+            <a:fillRect/>
+          </a:stretch>
+        </p:blipFill>
+        <p:spPr>
+          <a:xfrm>
+            <a:off x="4545016" y="3148576"/>
+            <a:ext cx="3028943" cy="3207774"/>
+          </a:xfrm>
+          <a:prstGeom prst="rect">
+            <a:avLst/>
+          </a:prstGeom>
+        </p:spPr>
+      </p:pic>
     </p:spTree>
     <p:extLst>
       <p:ext uri="{BB962C8B-B14F-4D97-AF65-F5344CB8AC3E}">
-        <p14:creationId xmlns:p14="http://schemas.microsoft.com/office/powerpoint/2010/main" val="1827065741"/>
+        <p14:creationId xmlns:p14="http://schemas.microsoft.com/office/powerpoint/2010/main" val="1313805270"/>
       </p:ext>
     </p:extLst>
   </p:cSld>
@@ -4755,7 +5608,7 @@
         <p:spPr>
           <a:xfrm>
             <a:off x="0" y="1299607"/>
-            <a:ext cx="12192000" cy="1646605"/>
+            <a:ext cx="12192000" cy="2031325"/>
           </a:xfrm>
           <a:prstGeom prst="rect">
             <a:avLst/>
@@ -4774,6 +5627,164 @@
             </a:r>
             <a:r>
               <a:rPr lang="en-US" sz="3800" b="1" dirty="0" smtClean="0"/>
+              <a:t>Exception handling</a:t>
+            </a:r>
+          </a:p>
+          <a:p>
+            <a:endParaRPr lang="en-US" sz="3800" b="1" dirty="0"/>
+          </a:p>
+          <a:p>
+            <a:pPr marL="1485900" lvl="2" indent="-571500">
+              <a:buFont typeface="Arial" charset="0"/>
+              <a:buChar char="•"/>
+            </a:pPr>
+            <a:r>
+              <a:rPr lang="en-US" sz="2500" dirty="0" smtClean="0"/>
+              <a:t>Try, catch and finally</a:t>
+            </a:r>
+          </a:p>
+          <a:p>
+            <a:pPr marL="1485900" lvl="2" indent="-571500">
+              <a:buFont typeface="Arial" charset="0"/>
+              <a:buChar char="•"/>
+            </a:pPr>
+            <a:r>
+              <a:rPr lang="en-US" sz="2500" dirty="0" smtClean="0"/>
+              <a:t>What is the output?</a:t>
+            </a:r>
+            <a:endParaRPr lang="en-US" sz="2500" dirty="0" smtClean="0"/>
+          </a:p>
+        </p:txBody>
+      </p:sp>
+      <p:pic>
+        <p:nvPicPr>
+          <p:cNvPr id="2" name="Picture 1"/>
+          <p:cNvPicPr>
+            <a:picLocks noChangeAspect="1"/>
+          </p:cNvPicPr>
+          <p:nvPr/>
+        </p:nvPicPr>
+        <p:blipFill>
+          <a:blip r:embed="rId3">
+            <a:extLst>
+              <a:ext uri="{28A0092B-C50C-407E-A947-70E740481C1C}">
+                <a14:useLocalDpi xmlns:a14="http://schemas.microsoft.com/office/drawing/2010/main" val="0"/>
+              </a:ext>
+            </a:extLst>
+          </a:blip>
+          <a:stretch>
+            <a:fillRect/>
+          </a:stretch>
+        </p:blipFill>
+        <p:spPr>
+          <a:xfrm>
+            <a:off x="6796044" y="2093412"/>
+            <a:ext cx="3629111" cy="3265129"/>
+          </a:xfrm>
+          <a:prstGeom prst="rect">
+            <a:avLst/>
+          </a:prstGeom>
+        </p:spPr>
+      </p:pic>
+    </p:spTree>
+    <p:extLst>
+      <p:ext uri="{BB962C8B-B14F-4D97-AF65-F5344CB8AC3E}">
+        <p14:creationId xmlns:p14="http://schemas.microsoft.com/office/powerpoint/2010/main" val="1827065741"/>
+      </p:ext>
+    </p:extLst>
+  </p:cSld>
+  <p:clrMapOvr>
+    <a:masterClrMapping/>
+  </p:clrMapOvr>
+  <p:timing>
+    <p:tnLst>
+      <p:par>
+        <p:cTn id="1" dur="indefinite" restart="never" nodeType="tmRoot"/>
+      </p:par>
+    </p:tnLst>
+  </p:timing>
+</p:sld>
+</file>
+
+<file path=ppt/slides/slide8.xml><?xml version="1.0" encoding="utf-8"?>
+<p:sld xmlns:a="http://schemas.openxmlformats.org/drawingml/2006/main" xmlns:r="http://schemas.openxmlformats.org/officeDocument/2006/relationships" xmlns:p="http://schemas.openxmlformats.org/presentationml/2006/main">
+  <p:cSld>
+    <p:bg>
+      <p:bgPr>
+        <a:solidFill>
+          <a:schemeClr val="accent5">
+            <a:lumMod val="60000"/>
+            <a:lumOff val="40000"/>
+          </a:schemeClr>
+        </a:solidFill>
+        <a:effectLst/>
+      </p:bgPr>
+    </p:bg>
+    <p:spTree>
+      <p:nvGrpSpPr>
+        <p:cNvPr id="1" name=""/>
+        <p:cNvGrpSpPr/>
+        <p:nvPr/>
+      </p:nvGrpSpPr>
+      <p:grpSpPr>
+        <a:xfrm>
+          <a:off x="0" y="0"/>
+          <a:ext cx="0" cy="0"/>
+          <a:chOff x="0" y="0"/>
+          <a:chExt cx="0" cy="0"/>
+        </a:xfrm>
+      </p:grpSpPr>
+      <p:sp>
+        <p:nvSpPr>
+          <p:cNvPr id="9" name="Slide Number Placeholder 8"/>
+          <p:cNvSpPr>
+            <a:spLocks noGrp="1"/>
+          </p:cNvSpPr>
+          <p:nvPr>
+            <p:ph type="sldNum" sz="quarter" idx="12"/>
+          </p:nvPr>
+        </p:nvSpPr>
+        <p:spPr/>
+        <p:txBody>
+          <a:bodyPr/>
+          <a:lstStyle/>
+          <a:p>
+            <a:fld id="{B822FDE6-25CA-0444-94EE-C6FC8C5EFEB8}" type="slidenum">
+              <a:rPr lang="en-US" smtClean="0"/>
+              <a:t>8</a:t>
+            </a:fld>
+            <a:endParaRPr lang="en-US"/>
+          </a:p>
+        </p:txBody>
+      </p:sp>
+      <p:sp>
+        <p:nvSpPr>
+          <p:cNvPr id="6" name="Rectangle 5"/>
+          <p:cNvSpPr/>
+          <p:nvPr/>
+        </p:nvSpPr>
+        <p:spPr>
+          <a:xfrm>
+            <a:off x="0" y="1299607"/>
+            <a:ext cx="12192000" cy="3570208"/>
+          </a:xfrm>
+          <a:prstGeom prst="rect">
+            <a:avLst/>
+          </a:prstGeom>
+          <a:noFill/>
+        </p:spPr>
+        <p:txBody>
+          <a:bodyPr wrap="square" lIns="91440" tIns="45720" rIns="91440" bIns="45720">
+            <a:spAutoFit/>
+          </a:bodyPr>
+          <a:lstStyle/>
+          <a:p>
+            <a:r>
+              <a:rPr lang="en-US" sz="3800" dirty="0" smtClean="0"/>
+              <a:t>	</a:t>
+            </a:r>
+            <a:r>
+              <a:rPr lang="en-US" sz="3800" b="1" dirty="0" smtClean="0"/>
               <a:t>Code smells</a:t>
             </a:r>
           </a:p>
@@ -4782,6 +5793,68 @@
           </a:p>
           <a:p>
             <a:pPr marL="1485900" lvl="2" indent="-571500">
+              <a:buFont typeface="Arial" charset="0"/>
+              <a:buChar char="•"/>
+            </a:pPr>
+            <a:r>
+              <a:rPr lang="en-US" sz="2500" dirty="0" smtClean="0"/>
+              <a:t>Describe common code smells discussed in class:</a:t>
+            </a:r>
+          </a:p>
+          <a:p>
+            <a:pPr marL="1943100" lvl="3" indent="-571500">
+              <a:buFont typeface="Arial" charset="0"/>
+              <a:buChar char="•"/>
+            </a:pPr>
+            <a:r>
+              <a:rPr lang="en-US" sz="2000" dirty="0"/>
+              <a:t>Contrived complexity</a:t>
+            </a:r>
+          </a:p>
+          <a:p>
+            <a:pPr marL="1943100" lvl="3" indent="-571500">
+              <a:buFont typeface="Arial" charset="0"/>
+              <a:buChar char="•"/>
+            </a:pPr>
+            <a:r>
+              <a:rPr lang="en-US" sz="2000" dirty="0" smtClean="0"/>
+              <a:t>Large class/god object</a:t>
+            </a:r>
+            <a:endParaRPr lang="en-US" sz="2000" dirty="0"/>
+          </a:p>
+          <a:p>
+            <a:pPr marL="1943100" lvl="3" indent="-571500">
+              <a:buFont typeface="Arial" charset="0"/>
+              <a:buChar char="•"/>
+            </a:pPr>
+            <a:r>
+              <a:rPr lang="en-US" sz="2000" dirty="0"/>
+              <a:t>Shotgun surgery</a:t>
+            </a:r>
+          </a:p>
+          <a:p>
+            <a:pPr marL="1943100" lvl="3" indent="-571500">
+              <a:buFont typeface="Arial" charset="0"/>
+              <a:buChar char="•"/>
+            </a:pPr>
+            <a:r>
+              <a:rPr lang="en-US" sz="2000" dirty="0" smtClean="0"/>
+              <a:t>Boat anchoring</a:t>
+            </a:r>
+            <a:endParaRPr lang="en-US" sz="2000" dirty="0"/>
+          </a:p>
+          <a:p>
+            <a:pPr marL="1943100" lvl="3" indent="-571500">
+              <a:buFont typeface="Arial" charset="0"/>
+              <a:buChar char="•"/>
+            </a:pPr>
+            <a:r>
+              <a:rPr lang="en-US" sz="2000" dirty="0"/>
+              <a:t>Cyclomatic complexity</a:t>
+            </a:r>
+          </a:p>
+          <a:p>
+            <a:pPr marL="1943100" lvl="3" indent="-571500">
               <a:buFont typeface="Arial" charset="0"/>
               <a:buChar char="•"/>
             </a:pPr>

</xml_diff>